<commit_message>
Added Course Materials - Day 6.
</commit_message>
<xml_diff>
--- a/2. Spring 5.0/Day 5/Slides/3. Building the Friends Web Services/building-the-friends-web-services-slides.pptx
+++ b/2. Spring 5.0/Day 5/Slides/3. Building the Friends Web Services/building-the-friends-web-services-slides.pptx
@@ -18688,8 +18688,8 @@
         </p:nvSpPr>
         <p:spPr>
           <a:xfrm>
-            <a:off x="13411200" y="5372100"/>
-            <a:ext cx="1720214" cy="995680"/>
+            <a:off x="12830175" y="5372100"/>
+            <a:ext cx="3347720" cy="502285"/>
           </a:xfrm>
           <a:prstGeom prst="rect">
             <a:avLst/>
@@ -18710,29 +18710,18 @@
               </a:spcBef>
             </a:pPr>
             <a:r>
+              <a:rPr lang="en-US" sz="3200" spc="65" dirty="0">
+                <a:latin typeface="Verdana" panose="020B0604030504040204"/>
+                <a:cs typeface="Verdana" panose="020B0604030504040204"/>
+              </a:rPr>
+              <a:t>Postgre</a:t>
+            </a:r>
+            <a:r>
               <a:rPr sz="3200" spc="65" dirty="0">
                 <a:latin typeface="Verdana" panose="020B0604030504040204"/>
                 <a:cs typeface="Verdana" panose="020B0604030504040204"/>
               </a:rPr>
-              <a:t>MySQL</a:t>
-            </a:r>
-            <a:endParaRPr sz="3200">
-              <a:latin typeface="Verdana" panose="020B0604030504040204"/>
-              <a:cs typeface="Verdana" panose="020B0604030504040204"/>
-            </a:endParaRPr>
-          </a:p>
-          <a:p>
-            <a:pPr marL="12700">
-              <a:lnSpc>
-                <a:spcPts val="3820"/>
-              </a:lnSpc>
-            </a:pPr>
-            <a:r>
-              <a:rPr sz="3200" spc="-15" dirty="0">
-                <a:latin typeface="Verdana" panose="020B0604030504040204"/>
-                <a:cs typeface="Verdana" panose="020B0604030504040204"/>
-              </a:rPr>
-              <a:t>MariaDB</a:t>
+              <a:t>SQL</a:t>
             </a:r>
             <a:endParaRPr sz="3200">
               <a:latin typeface="Verdana" panose="020B0604030504040204"/>
@@ -20896,7 +20885,7 @@
         <p:spPr>
           <a:xfrm>
             <a:off x="863600" y="2832100"/>
-            <a:ext cx="10369550" cy="4549140"/>
+            <a:ext cx="10369550" cy="4608830"/>
           </a:xfrm>
           <a:prstGeom prst="rect">
             <a:avLst/>

</xml_diff>